<commit_message>
post data saturdays redmond checkin
</commit_message>
<xml_diff>
--- a/i-love-dbatools/i-love-dbatools-template.pptx
+++ b/i-love-dbatools/i-love-dbatools-template.pptx
@@ -9,7 +9,7 @@
     <p:notesMasterId r:id="rId10"/>
   </p:notesMasterIdLst>
   <p:sldIdLst>
-    <p:sldId id="294" r:id="rId6"/>
+    <p:sldId id="297" r:id="rId6"/>
     <p:sldId id="295" r:id="rId7"/>
     <p:sldId id="296" r:id="rId8"/>
     <p:sldId id="293" r:id="rId9"/>
@@ -9545,7 +9545,7 @@
           <p:cNvPr id="2" name="Rubrik 1">
             <a:extLst>
               <a:ext uri="{FF2B5EF4-FFF2-40B4-BE49-F238E27FC236}">
-                <a16:creationId xmlns:a16="http://schemas.microsoft.com/office/drawing/2014/main" id="{5B604DEB-919E-4875-A8AC-596991152555}"/>
+                <a16:creationId xmlns:a16="http://schemas.microsoft.com/office/drawing/2014/main" id="{87D6F25C-D1C3-4925-B69F-4A89B0021940}"/>
               </a:ext>
             </a:extLst>
           </p:cNvPr>
@@ -9553,7 +9553,7 @@
             <a:spLocks noGrp="1"/>
           </p:cNvSpPr>
           <p:nvPr>
-            <p:ph type="ctrTitle"/>
+            <p:ph type="title"/>
           </p:nvPr>
         </p:nvSpPr>
         <p:spPr/>
@@ -9567,11 +9567,11 @@
             </a:r>
             <a:r>
               <a:rPr lang="sv-SE" dirty="0" err="1"/>
-              <a:t>romantic</a:t>
+              <a:t>Romantic</a:t>
             </a:r>
             <a:r>
               <a:rPr lang="sv-SE" dirty="0"/>
-              <a:t> relation </a:t>
+              <a:t> Relation </a:t>
             </a:r>
             <a:r>
               <a:rPr lang="sv-SE" dirty="0" err="1"/>
@@ -9591,7 +9591,23 @@
             </a:r>
             <a:r>
               <a:rPr lang="sv-SE" dirty="0" err="1"/>
-              <a:t>generally</a:t>
+              <a:t>Generally</a:t>
+            </a:r>
+            <a:r>
+              <a:rPr lang="sv-SE" dirty="0"/>
+              <a:t> and </a:t>
+            </a:r>
+            <a:r>
+              <a:rPr lang="sv-SE" dirty="0" err="1"/>
+              <a:t>dbatools</a:t>
+            </a:r>
+            <a:r>
+              <a:rPr lang="sv-SE" dirty="0"/>
+              <a:t> </a:t>
+            </a:r>
+            <a:r>
+              <a:rPr lang="sv-SE" dirty="0" err="1"/>
+              <a:t>Especially</a:t>
             </a:r>
             <a:endParaRPr lang="sv-SE" dirty="0"/>
           </a:p>
@@ -9599,10 +9615,10 @@
       </p:sp>
       <p:sp>
         <p:nvSpPr>
-          <p:cNvPr id="3" name="Underrubrik 2">
+          <p:cNvPr id="3" name="Platshållare för innehåll 2">
             <a:extLst>
               <a:ext uri="{FF2B5EF4-FFF2-40B4-BE49-F238E27FC236}">
-                <a16:creationId xmlns:a16="http://schemas.microsoft.com/office/drawing/2014/main" id="{E82BB9C6-5C05-4233-9CDF-A92081180751}"/>
+                <a16:creationId xmlns:a16="http://schemas.microsoft.com/office/drawing/2014/main" id="{D5C1C002-75CA-4210-BF46-4103386EBF5B}"/>
               </a:ext>
             </a:extLst>
           </p:cNvPr>
@@ -9610,57 +9626,37 @@
             <a:spLocks noGrp="1"/>
           </p:cNvSpPr>
           <p:nvPr>
-            <p:ph type="subTitle" idx="1"/>
+            <p:ph idx="1"/>
           </p:nvPr>
         </p:nvSpPr>
         <p:spPr/>
         <p:txBody>
-          <a:bodyPr>
-            <a:normAutofit lnSpcReduction="10000"/>
-          </a:bodyPr>
+          <a:bodyPr/>
           <a:lstStyle/>
           <a:p>
             <a:r>
               <a:rPr lang="sv-SE" dirty="0"/>
-              <a:t>and </a:t>
+              <a:t>Conference </a:t>
             </a:r>
             <a:r>
               <a:rPr lang="sv-SE" dirty="0" err="1"/>
-              <a:t>with</a:t>
-            </a:r>
-            <a:r>
-              <a:rPr lang="sv-SE" dirty="0"/>
-              <a:t> </a:t>
-            </a:r>
-            <a:r>
-              <a:rPr lang="sv-SE" dirty="0" err="1"/>
-              <a:t>dbatools</a:t>
-            </a:r>
-            <a:r>
-              <a:rPr lang="sv-SE" dirty="0"/>
-              <a:t> </a:t>
-            </a:r>
-            <a:r>
-              <a:rPr lang="sv-SE" dirty="0" err="1"/>
-              <a:t>especially</a:t>
+              <a:t>name</a:t>
             </a:r>
             <a:endParaRPr lang="sv-SE" dirty="0"/>
           </a:p>
           <a:p>
+            <a:r>
+              <a:rPr lang="sv-SE"/>
+              <a:t>Date</a:t>
+            </a:r>
             <a:endParaRPr lang="sv-SE" dirty="0"/>
-          </a:p>
-          <a:p>
-            <a:r>
-              <a:rPr lang="sv-SE" dirty="0"/>
-              <a:t>Data Saturday Redmond April 17 2021</a:t>
-            </a:r>
           </a:p>
         </p:txBody>
       </p:sp>
     </p:spTree>
     <p:extLst>
       <p:ext uri="{BB962C8B-B14F-4D97-AF65-F5344CB8AC3E}">
-        <p14:creationId xmlns:p14="http://schemas.microsoft.com/office/powerpoint/2010/main" val="639762419"/>
+        <p14:creationId xmlns:p14="http://schemas.microsoft.com/office/powerpoint/2010/main" val="351272416"/>
       </p:ext>
     </p:extLst>
   </p:cSld>

</xml_diff>